<commit_message>
Sending messages to many consumers at once.
</commit_message>
<xml_diff>
--- a/Presentation/RabbitMQ.pptx
+++ b/Presentation/RabbitMQ.pptx
@@ -518,7 +518,7 @@
               <a:t>rabbitmq</a:t>
             </a:r>
             <a:r>
-              <a:rPr lang="en-US"/>
+              <a:rPr lang="en-US" dirty="0"/>
               <a:t> -p 5672:5672 -p 15672:15672 rabbitmq:3.9-management</a:t>
             </a:r>
           </a:p>
@@ -4705,6 +4705,36 @@
           <a:xfrm>
             <a:off x="403224" y="1311756"/>
             <a:ext cx="9048750" cy="609600"/>
+          </a:xfrm>
+          <a:prstGeom prst="rect">
+            <a:avLst/>
+          </a:prstGeom>
+        </p:spPr>
+      </p:pic>
+      <p:pic>
+        <p:nvPicPr>
+          <p:cNvPr id="7" name="Picture 6">
+            <a:extLst>
+              <a:ext uri="{FF2B5EF4-FFF2-40B4-BE49-F238E27FC236}">
+                <a16:creationId xmlns:a16="http://schemas.microsoft.com/office/drawing/2014/main" id="{5D88197F-9293-44D0-AFFD-486A08E034FB}"/>
+              </a:ext>
+            </a:extLst>
+          </p:cNvPr>
+          <p:cNvPicPr>
+            <a:picLocks noChangeAspect="1"/>
+          </p:cNvPicPr>
+          <p:nvPr/>
+        </p:nvPicPr>
+        <p:blipFill>
+          <a:blip r:embed="rId4"/>
+          <a:stretch>
+            <a:fillRect/>
+          </a:stretch>
+        </p:blipFill>
+        <p:spPr>
+          <a:xfrm>
+            <a:off x="0" y="2118812"/>
+            <a:ext cx="12192000" cy="1092200"/>
           </a:xfrm>
           <a:prstGeom prst="rect">
             <a:avLst/>

</xml_diff>